<commit_message>
Update - Key/Value store illustration
</commit_message>
<xml_diff>
--- a/diagrams/global_storage.pptx
+++ b/diagrams/global_storage.pptx
@@ -34,6 +34,7 @@
     <p:sldId id="283" r:id="rId28"/>
     <p:sldId id="284" r:id="rId29"/>
     <p:sldId id="285" r:id="rId30"/>
+    <p:sldId id="286" r:id="rId31"/>
   </p:sldIdLst>
   <p:sldSz cx="12192000" cy="6858000"/>
   <p:notesSz cx="6858000" cy="9144000"/>
@@ -43501,6 +43502,423 @@
     <p:extLst>
       <p:ext uri="{BB962C8B-B14F-4D97-AF65-F5344CB8AC3E}">
         <p14:creationId xmlns:p14="http://schemas.microsoft.com/office/powerpoint/2010/main" val="1223731933"/>
+      </p:ext>
+    </p:extLst>
+  </p:cSld>
+  <p:clrMapOvr>
+    <a:masterClrMapping/>
+  </p:clrMapOvr>
+</p:sld>
+</file>
+
+<file path=ppt/slides/slide30.xml><?xml version="1.0" encoding="utf-8"?>
+<p:sld xmlns:a="http://schemas.openxmlformats.org/drawingml/2006/main" xmlns:r="http://schemas.openxmlformats.org/officeDocument/2006/relationships" xmlns:p="http://schemas.openxmlformats.org/presentationml/2006/main">
+  <p:cSld>
+    <p:spTree>
+      <p:nvGrpSpPr>
+        <p:cNvPr id="1" name=""/>
+        <p:cNvGrpSpPr/>
+        <p:nvPr/>
+      </p:nvGrpSpPr>
+      <p:grpSpPr>
+        <a:xfrm>
+          <a:off x="0" y="0"/>
+          <a:ext cx="0" cy="0"/>
+          <a:chOff x="0" y="0"/>
+          <a:chExt cx="0" cy="0"/>
+        </a:xfrm>
+      </p:grpSpPr>
+      <p:sp>
+        <p:nvSpPr>
+          <p:cNvPr id="4" name="TextBox 3">
+            <a:extLst>
+              <a:ext uri="{FF2B5EF4-FFF2-40B4-BE49-F238E27FC236}">
+                <a16:creationId xmlns:a16="http://schemas.microsoft.com/office/drawing/2014/main" id="{B162801C-762F-E94B-A835-73FA42117F87}"/>
+              </a:ext>
+            </a:extLst>
+          </p:cNvPr>
+          <p:cNvSpPr txBox="1"/>
+          <p:nvPr/>
+        </p:nvSpPr>
+        <p:spPr>
+          <a:xfrm>
+            <a:off x="881349" y="3822256"/>
+            <a:ext cx="1454227" cy="369332"/>
+          </a:xfrm>
+          <a:prstGeom prst="rect">
+            <a:avLst/>
+          </a:prstGeom>
+          <a:solidFill>
+            <a:schemeClr val="accent6">
+              <a:lumMod val="20000"/>
+              <a:lumOff val="80000"/>
+            </a:schemeClr>
+          </a:solidFill>
+          <a:ln w="38100">
+            <a:solidFill>
+              <a:schemeClr val="tx1"/>
+            </a:solidFill>
+          </a:ln>
+        </p:spPr>
+        <p:txBody>
+          <a:bodyPr wrap="square" rtlCol="0">
+            <a:spAutoFit/>
+          </a:bodyPr>
+          <a:lstStyle/>
+          <a:p>
+            <a:pPr algn="ctr"/>
+            <a:r>
+              <a:rPr lang="en-US" dirty="0"/>
+              <a:t>telephone</a:t>
+            </a:r>
+          </a:p>
+        </p:txBody>
+      </p:sp>
+      <p:sp>
+        <p:nvSpPr>
+          <p:cNvPr id="56" name="TextBox 55">
+            <a:extLst>
+              <a:ext uri="{FF2B5EF4-FFF2-40B4-BE49-F238E27FC236}">
+                <a16:creationId xmlns:a16="http://schemas.microsoft.com/office/drawing/2014/main" id="{D46579A6-8F05-9D4A-8E02-48DBD81FD95A}"/>
+              </a:ext>
+            </a:extLst>
+          </p:cNvPr>
+          <p:cNvSpPr txBox="1"/>
+          <p:nvPr/>
+        </p:nvSpPr>
+        <p:spPr>
+          <a:xfrm>
+            <a:off x="2747219" y="3525661"/>
+            <a:ext cx="1849559" cy="369332"/>
+          </a:xfrm>
+          <a:prstGeom prst="rect">
+            <a:avLst/>
+          </a:prstGeom>
+          <a:solidFill>
+            <a:schemeClr val="accent1">
+              <a:lumMod val="20000"/>
+              <a:lumOff val="80000"/>
+            </a:schemeClr>
+          </a:solidFill>
+          <a:ln w="38100">
+            <a:solidFill>
+              <a:schemeClr val="tx1"/>
+            </a:solidFill>
+          </a:ln>
+        </p:spPr>
+        <p:txBody>
+          <a:bodyPr wrap="square" rtlCol="0">
+            <a:spAutoFit/>
+          </a:bodyPr>
+          <a:lstStyle/>
+          <a:p>
+            <a:pPr algn="ctr"/>
+            <a:r>
+              <a:rPr lang="en-US" dirty="0"/>
+              <a:t>"211-555-9012"</a:t>
+            </a:r>
+          </a:p>
+        </p:txBody>
+      </p:sp>
+      <p:cxnSp>
+        <p:nvCxnSpPr>
+          <p:cNvPr id="57" name="Straight Connector 56">
+            <a:extLst>
+              <a:ext uri="{FF2B5EF4-FFF2-40B4-BE49-F238E27FC236}">
+                <a16:creationId xmlns:a16="http://schemas.microsoft.com/office/drawing/2014/main" id="{069E7C1F-6498-AA4A-96AE-DF0F1C0EFE00}"/>
+              </a:ext>
+            </a:extLst>
+          </p:cNvPr>
+          <p:cNvCxnSpPr>
+            <a:cxnSpLocks/>
+          </p:cNvCxnSpPr>
+          <p:nvPr/>
+        </p:nvCxnSpPr>
+        <p:spPr>
+          <a:xfrm>
+            <a:off x="2319097" y="4015136"/>
+            <a:ext cx="197553" cy="0"/>
+          </a:xfrm>
+          <a:prstGeom prst="line">
+            <a:avLst/>
+          </a:prstGeom>
+          <a:ln w="38100"/>
+        </p:spPr>
+        <p:style>
+          <a:lnRef idx="1">
+            <a:schemeClr val="accent1"/>
+          </a:lnRef>
+          <a:fillRef idx="0">
+            <a:schemeClr val="accent1"/>
+          </a:fillRef>
+          <a:effectRef idx="0">
+            <a:schemeClr val="accent1"/>
+          </a:effectRef>
+          <a:fontRef idx="minor">
+            <a:schemeClr val="tx1"/>
+          </a:fontRef>
+        </p:style>
+      </p:cxnSp>
+      <p:sp>
+        <p:nvSpPr>
+          <p:cNvPr id="58" name="TextBox 57">
+            <a:extLst>
+              <a:ext uri="{FF2B5EF4-FFF2-40B4-BE49-F238E27FC236}">
+                <a16:creationId xmlns:a16="http://schemas.microsoft.com/office/drawing/2014/main" id="{347B5CBE-07CD-664D-958C-3B86FD234C15}"/>
+              </a:ext>
+            </a:extLst>
+          </p:cNvPr>
+          <p:cNvSpPr txBox="1"/>
+          <p:nvPr/>
+        </p:nvSpPr>
+        <p:spPr>
+          <a:xfrm>
+            <a:off x="4592502" y="3517420"/>
+            <a:ext cx="1849555" cy="369332"/>
+          </a:xfrm>
+          <a:prstGeom prst="rect">
+            <a:avLst/>
+          </a:prstGeom>
+          <a:solidFill>
+            <a:schemeClr val="accent2">
+              <a:lumMod val="20000"/>
+              <a:lumOff val="80000"/>
+            </a:schemeClr>
+          </a:solidFill>
+          <a:ln w="38100">
+            <a:solidFill>
+              <a:schemeClr val="tx1"/>
+            </a:solidFill>
+          </a:ln>
+        </p:spPr>
+        <p:txBody>
+          <a:bodyPr wrap="square" rtlCol="0">
+            <a:spAutoFit/>
+          </a:bodyPr>
+          <a:lstStyle/>
+          <a:p>
+            <a:pPr algn="ctr"/>
+            <a:r>
+              <a:rPr lang="en-US" dirty="0"/>
+              <a:t>"James, George"</a:t>
+            </a:r>
+          </a:p>
+        </p:txBody>
+      </p:sp>
+      <p:cxnSp>
+        <p:nvCxnSpPr>
+          <p:cNvPr id="61" name="Straight Connector 60">
+            <a:extLst>
+              <a:ext uri="{FF2B5EF4-FFF2-40B4-BE49-F238E27FC236}">
+                <a16:creationId xmlns:a16="http://schemas.microsoft.com/office/drawing/2014/main" id="{ED8E7AEB-1429-1340-9D3B-802AC83FF776}"/>
+              </a:ext>
+            </a:extLst>
+          </p:cNvPr>
+          <p:cNvCxnSpPr>
+            <a:cxnSpLocks/>
+          </p:cNvCxnSpPr>
+          <p:nvPr/>
+        </p:nvCxnSpPr>
+        <p:spPr>
+          <a:xfrm>
+            <a:off x="2516650" y="3715243"/>
+            <a:ext cx="0" cy="667264"/>
+          </a:xfrm>
+          <a:prstGeom prst="line">
+            <a:avLst/>
+          </a:prstGeom>
+          <a:ln w="38100"/>
+        </p:spPr>
+        <p:style>
+          <a:lnRef idx="1">
+            <a:schemeClr val="accent1"/>
+          </a:lnRef>
+          <a:fillRef idx="0">
+            <a:schemeClr val="accent1"/>
+          </a:fillRef>
+          <a:effectRef idx="0">
+            <a:schemeClr val="accent1"/>
+          </a:effectRef>
+          <a:fontRef idx="minor">
+            <a:schemeClr val="tx1"/>
+          </a:fontRef>
+        </p:style>
+      </p:cxnSp>
+      <p:cxnSp>
+        <p:nvCxnSpPr>
+          <p:cNvPr id="62" name="Straight Connector 61">
+            <a:extLst>
+              <a:ext uri="{FF2B5EF4-FFF2-40B4-BE49-F238E27FC236}">
+                <a16:creationId xmlns:a16="http://schemas.microsoft.com/office/drawing/2014/main" id="{7842B537-C770-1A48-B93F-0CE25AB9284A}"/>
+              </a:ext>
+            </a:extLst>
+          </p:cNvPr>
+          <p:cNvCxnSpPr>
+            <a:cxnSpLocks/>
+            <a:endCxn id="56" idx="1"/>
+          </p:cNvCxnSpPr>
+          <p:nvPr/>
+        </p:nvCxnSpPr>
+        <p:spPr>
+          <a:xfrm>
+            <a:off x="2516650" y="3710327"/>
+            <a:ext cx="230569" cy="0"/>
+          </a:xfrm>
+          <a:prstGeom prst="line">
+            <a:avLst/>
+          </a:prstGeom>
+          <a:ln w="38100"/>
+        </p:spPr>
+        <p:style>
+          <a:lnRef idx="1">
+            <a:schemeClr val="accent1"/>
+          </a:lnRef>
+          <a:fillRef idx="0">
+            <a:schemeClr val="accent1"/>
+          </a:fillRef>
+          <a:effectRef idx="0">
+            <a:schemeClr val="accent1"/>
+          </a:effectRef>
+          <a:fontRef idx="minor">
+            <a:schemeClr val="tx1"/>
+          </a:fontRef>
+        </p:style>
+      </p:cxnSp>
+      <p:cxnSp>
+        <p:nvCxnSpPr>
+          <p:cNvPr id="63" name="Straight Connector 62">
+            <a:extLst>
+              <a:ext uri="{FF2B5EF4-FFF2-40B4-BE49-F238E27FC236}">
+                <a16:creationId xmlns:a16="http://schemas.microsoft.com/office/drawing/2014/main" id="{B4E45706-1EB9-5D44-96A9-A83E90A02CAA}"/>
+              </a:ext>
+            </a:extLst>
+          </p:cNvPr>
+          <p:cNvCxnSpPr>
+            <a:cxnSpLocks/>
+          </p:cNvCxnSpPr>
+          <p:nvPr/>
+        </p:nvCxnSpPr>
+        <p:spPr>
+          <a:xfrm>
+            <a:off x="2516650" y="4357000"/>
+            <a:ext cx="234685" cy="0"/>
+          </a:xfrm>
+          <a:prstGeom prst="line">
+            <a:avLst/>
+          </a:prstGeom>
+          <a:ln w="38100"/>
+        </p:spPr>
+        <p:style>
+          <a:lnRef idx="1">
+            <a:schemeClr val="accent1"/>
+          </a:lnRef>
+          <a:fillRef idx="0">
+            <a:schemeClr val="accent1"/>
+          </a:fillRef>
+          <a:effectRef idx="0">
+            <a:schemeClr val="accent1"/>
+          </a:effectRef>
+          <a:fontRef idx="minor">
+            <a:schemeClr val="tx1"/>
+          </a:fontRef>
+        </p:style>
+      </p:cxnSp>
+      <p:sp>
+        <p:nvSpPr>
+          <p:cNvPr id="30" name="TextBox 29">
+            <a:extLst>
+              <a:ext uri="{FF2B5EF4-FFF2-40B4-BE49-F238E27FC236}">
+                <a16:creationId xmlns:a16="http://schemas.microsoft.com/office/drawing/2014/main" id="{E83AB936-A317-5144-85F5-E3F691F78B42}"/>
+              </a:ext>
+            </a:extLst>
+          </p:cNvPr>
+          <p:cNvSpPr txBox="1"/>
+          <p:nvPr/>
+        </p:nvSpPr>
+        <p:spPr>
+          <a:xfrm>
+            <a:off x="2751335" y="4147621"/>
+            <a:ext cx="1849559" cy="369332"/>
+          </a:xfrm>
+          <a:prstGeom prst="rect">
+            <a:avLst/>
+          </a:prstGeom>
+          <a:solidFill>
+            <a:schemeClr val="accent1">
+              <a:lumMod val="20000"/>
+              <a:lumOff val="80000"/>
+            </a:schemeClr>
+          </a:solidFill>
+          <a:ln w="38100">
+            <a:solidFill>
+              <a:schemeClr val="tx1"/>
+            </a:solidFill>
+          </a:ln>
+        </p:spPr>
+        <p:txBody>
+          <a:bodyPr wrap="square" rtlCol="0">
+            <a:spAutoFit/>
+          </a:bodyPr>
+          <a:lstStyle/>
+          <a:p>
+            <a:pPr algn="ctr"/>
+            <a:r>
+              <a:rPr lang="en-US" dirty="0"/>
+              <a:t>"617-555-1414"</a:t>
+            </a:r>
+          </a:p>
+        </p:txBody>
+      </p:sp>
+      <p:sp>
+        <p:nvSpPr>
+          <p:cNvPr id="31" name="TextBox 30">
+            <a:extLst>
+              <a:ext uri="{FF2B5EF4-FFF2-40B4-BE49-F238E27FC236}">
+                <a16:creationId xmlns:a16="http://schemas.microsoft.com/office/drawing/2014/main" id="{BD85E0C2-E3F9-BF42-9BC0-2486FE89181D}"/>
+              </a:ext>
+            </a:extLst>
+          </p:cNvPr>
+          <p:cNvSpPr txBox="1"/>
+          <p:nvPr/>
+        </p:nvSpPr>
+        <p:spPr>
+          <a:xfrm>
+            <a:off x="4596618" y="4139380"/>
+            <a:ext cx="1845433" cy="369332"/>
+          </a:xfrm>
+          <a:prstGeom prst="rect">
+            <a:avLst/>
+          </a:prstGeom>
+          <a:solidFill>
+            <a:schemeClr val="accent2">
+              <a:lumMod val="20000"/>
+              <a:lumOff val="80000"/>
+            </a:schemeClr>
+          </a:solidFill>
+          <a:ln w="38100">
+            <a:solidFill>
+              <a:schemeClr val="tx1"/>
+            </a:solidFill>
+          </a:ln>
+        </p:spPr>
+        <p:txBody>
+          <a:bodyPr wrap="square" rtlCol="0">
+            <a:spAutoFit/>
+          </a:bodyPr>
+          <a:lstStyle/>
+          <a:p>
+            <a:pPr algn="ctr"/>
+            <a:r>
+              <a:rPr lang="en-US" dirty="0"/>
+              <a:t>"Tweed, Rob"</a:t>
+            </a:r>
+          </a:p>
+        </p:txBody>
+      </p:sp>
+    </p:spTree>
+    <p:extLst>
+      <p:ext uri="{BB962C8B-B14F-4D97-AF65-F5344CB8AC3E}">
+        <p14:creationId xmlns:p14="http://schemas.microsoft.com/office/powerpoint/2010/main" val="3441346461"/>
       </p:ext>
     </p:extLst>
   </p:cSld>

</xml_diff>